<commit_message>
Remoção de imagens não utilizadas e implementação das informações do usuário logado.
</commit_message>
<xml_diff>
--- a/documentacao/Icones-app.pptx
+++ b/documentacao/Icones-app.pptx
@@ -259,7 +259,7 @@
           <a:p>
             <a:fld id="{26B16881-8F40-4193-BC0F-D959B67952D1}" type="datetimeFigureOut">
               <a:rPr lang="pt-BR" smtClean="0"/>
-              <a:t>10/03/2024</a:t>
+              <a:t>17/06/2024</a:t>
             </a:fld>
             <a:endParaRPr lang="pt-BR"/>
           </a:p>
@@ -457,7 +457,7 @@
           <a:p>
             <a:fld id="{26B16881-8F40-4193-BC0F-D959B67952D1}" type="datetimeFigureOut">
               <a:rPr lang="pt-BR" smtClean="0"/>
-              <a:t>10/03/2024</a:t>
+              <a:t>17/06/2024</a:t>
             </a:fld>
             <a:endParaRPr lang="pt-BR"/>
           </a:p>
@@ -665,7 +665,7 @@
           <a:p>
             <a:fld id="{26B16881-8F40-4193-BC0F-D959B67952D1}" type="datetimeFigureOut">
               <a:rPr lang="pt-BR" smtClean="0"/>
-              <a:t>10/03/2024</a:t>
+              <a:t>17/06/2024</a:t>
             </a:fld>
             <a:endParaRPr lang="pt-BR"/>
           </a:p>
@@ -863,7 +863,7 @@
           <a:p>
             <a:fld id="{26B16881-8F40-4193-BC0F-D959B67952D1}" type="datetimeFigureOut">
               <a:rPr lang="pt-BR" smtClean="0"/>
-              <a:t>10/03/2024</a:t>
+              <a:t>17/06/2024</a:t>
             </a:fld>
             <a:endParaRPr lang="pt-BR"/>
           </a:p>
@@ -1138,7 +1138,7 @@
           <a:p>
             <a:fld id="{26B16881-8F40-4193-BC0F-D959B67952D1}" type="datetimeFigureOut">
               <a:rPr lang="pt-BR" smtClean="0"/>
-              <a:t>10/03/2024</a:t>
+              <a:t>17/06/2024</a:t>
             </a:fld>
             <a:endParaRPr lang="pt-BR"/>
           </a:p>
@@ -1403,7 +1403,7 @@
           <a:p>
             <a:fld id="{26B16881-8F40-4193-BC0F-D959B67952D1}" type="datetimeFigureOut">
               <a:rPr lang="pt-BR" smtClean="0"/>
-              <a:t>10/03/2024</a:t>
+              <a:t>17/06/2024</a:t>
             </a:fld>
             <a:endParaRPr lang="pt-BR"/>
           </a:p>
@@ -1815,7 +1815,7 @@
           <a:p>
             <a:fld id="{26B16881-8F40-4193-BC0F-D959B67952D1}" type="datetimeFigureOut">
               <a:rPr lang="pt-BR" smtClean="0"/>
-              <a:t>10/03/2024</a:t>
+              <a:t>17/06/2024</a:t>
             </a:fld>
             <a:endParaRPr lang="pt-BR"/>
           </a:p>
@@ -1956,7 +1956,7 @@
           <a:p>
             <a:fld id="{26B16881-8F40-4193-BC0F-D959B67952D1}" type="datetimeFigureOut">
               <a:rPr lang="pt-BR" smtClean="0"/>
-              <a:t>10/03/2024</a:t>
+              <a:t>17/06/2024</a:t>
             </a:fld>
             <a:endParaRPr lang="pt-BR"/>
           </a:p>
@@ -2069,7 +2069,7 @@
           <a:p>
             <a:fld id="{26B16881-8F40-4193-BC0F-D959B67952D1}" type="datetimeFigureOut">
               <a:rPr lang="pt-BR" smtClean="0"/>
-              <a:t>10/03/2024</a:t>
+              <a:t>17/06/2024</a:t>
             </a:fld>
             <a:endParaRPr lang="pt-BR"/>
           </a:p>
@@ -2380,7 +2380,7 @@
           <a:p>
             <a:fld id="{26B16881-8F40-4193-BC0F-D959B67952D1}" type="datetimeFigureOut">
               <a:rPr lang="pt-BR" smtClean="0"/>
-              <a:t>10/03/2024</a:t>
+              <a:t>17/06/2024</a:t>
             </a:fld>
             <a:endParaRPr lang="pt-BR"/>
           </a:p>
@@ -2668,7 +2668,7 @@
           <a:p>
             <a:fld id="{26B16881-8F40-4193-BC0F-D959B67952D1}" type="datetimeFigureOut">
               <a:rPr lang="pt-BR" smtClean="0"/>
-              <a:t>10/03/2024</a:t>
+              <a:t>17/06/2024</a:t>
             </a:fld>
             <a:endParaRPr lang="pt-BR"/>
           </a:p>
@@ -2909,7 +2909,7 @@
           <a:p>
             <a:fld id="{26B16881-8F40-4193-BC0F-D959B67952D1}" type="datetimeFigureOut">
               <a:rPr lang="pt-BR" smtClean="0"/>
-              <a:t>10/03/2024</a:t>
+              <a:t>17/06/2024</a:t>
             </a:fld>
             <a:endParaRPr lang="pt-BR"/>
           </a:p>
@@ -3336,10 +3336,10 @@
       </p:grpSpPr>
       <p:sp>
         <p:nvSpPr>
-          <p:cNvPr id="2" name="Retângulo 1">
-            <a:extLst>
-              <a:ext uri="{FF2B5EF4-FFF2-40B4-BE49-F238E27FC236}">
-                <a16:creationId xmlns:a16="http://schemas.microsoft.com/office/drawing/2014/main" id="{120B9638-7FE7-9B1E-F2E9-997658D1736E}"/>
+          <p:cNvPr id="21" name="Retângulo 20">
+            <a:extLst>
+              <a:ext uri="{FF2B5EF4-FFF2-40B4-BE49-F238E27FC236}">
+                <a16:creationId xmlns:a16="http://schemas.microsoft.com/office/drawing/2014/main" id="{A1FCF899-5C87-3ACB-4A43-37938250B99A}"/>
               </a:ext>
             </a:extLst>
           </p:cNvPr>
@@ -3348,8 +3348,8 @@
         </p:nvSpPr>
         <p:spPr>
           <a:xfrm>
-            <a:off x="740536" y="1230057"/>
-            <a:ext cx="7038110" cy="706582"/>
+            <a:off x="840645" y="1082409"/>
+            <a:ext cx="6045063" cy="1035162"/>
           </a:xfrm>
           <a:prstGeom prst="rect">
             <a:avLst/>
@@ -3379,7 +3379,59 @@
           <a:lstStyle/>
           <a:p>
             <a:pPr algn="ctr"/>
-            <a:endParaRPr lang="pt-BR"/>
+            <a:endParaRPr lang="pt-BR" u="sng" dirty="0"/>
+          </a:p>
+        </p:txBody>
+      </p:sp>
+      <p:sp>
+        <p:nvSpPr>
+          <p:cNvPr id="2" name="Retângulo 1">
+            <a:extLst>
+              <a:ext uri="{FF2B5EF4-FFF2-40B4-BE49-F238E27FC236}">
+                <a16:creationId xmlns:a16="http://schemas.microsoft.com/office/drawing/2014/main" id="{120B9638-7FE7-9B1E-F2E9-997658D1736E}"/>
+              </a:ext>
+            </a:extLst>
+          </p:cNvPr>
+          <p:cNvSpPr/>
+          <p:nvPr/>
+        </p:nvSpPr>
+        <p:spPr>
+          <a:xfrm>
+            <a:off x="5843085" y="2851039"/>
+            <a:ext cx="1042623" cy="1035162"/>
+          </a:xfrm>
+          <a:prstGeom prst="rect">
+            <a:avLst/>
+          </a:prstGeom>
+          <a:solidFill>
+            <a:srgbClr val="13596F"/>
+          </a:solidFill>
+          <a:ln>
+            <a:noFill/>
+          </a:ln>
+        </p:spPr>
+        <p:style>
+          <a:lnRef idx="2">
+            <a:schemeClr val="accent1">
+              <a:shade val="15000"/>
+            </a:schemeClr>
+          </a:lnRef>
+          <a:fillRef idx="1">
+            <a:schemeClr val="accent1"/>
+          </a:fillRef>
+          <a:effectRef idx="0">
+            <a:schemeClr val="accent1"/>
+          </a:effectRef>
+          <a:fontRef idx="minor">
+            <a:schemeClr val="lt1"/>
+          </a:fontRef>
+        </p:style>
+        <p:txBody>
+          <a:bodyPr rtlCol="0" anchor="ctr"/>
+          <a:lstStyle/>
+          <a:p>
+            <a:pPr algn="ctr"/>
+            <a:endParaRPr lang="pt-BR" u="sng" dirty="0"/>
           </a:p>
         </p:txBody>
       </p:sp>
@@ -4001,6 +4053,45 @@
           <a:xfrm>
             <a:off x="4521249" y="1419990"/>
             <a:ext cx="360000" cy="360000"/>
+          </a:xfrm>
+          <a:prstGeom prst="rect">
+            <a:avLst/>
+          </a:prstGeom>
+        </p:spPr>
+      </p:pic>
+      <p:pic>
+        <p:nvPicPr>
+          <p:cNvPr id="17" name="Gráfico 16" descr="Coala com preenchimento sólido">
+            <a:extLst>
+              <a:ext uri="{FF2B5EF4-FFF2-40B4-BE49-F238E27FC236}">
+                <a16:creationId xmlns:a16="http://schemas.microsoft.com/office/drawing/2014/main" id="{0B42B614-1BB5-AEBF-6C68-C95A444DEEED}"/>
+              </a:ext>
+            </a:extLst>
+          </p:cNvPr>
+          <p:cNvPicPr>
+            <a:picLocks noChangeAspect="1"/>
+          </p:cNvPicPr>
+          <p:nvPr/>
+        </p:nvPicPr>
+        <p:blipFill>
+          <a:blip r:embed="rId34">
+            <a:extLst>
+              <a:ext uri="{28A0092B-C50C-407E-A947-70E740481C1C}">
+                <a14:useLocalDpi xmlns:a14="http://schemas.microsoft.com/office/drawing/2010/main" val="0"/>
+              </a:ext>
+              <a:ext uri="{96DAC541-7B7A-43D3-8B79-37D633B846F1}">
+                <asvg:svgBlip xmlns:asvg="http://schemas.microsoft.com/office/drawing/2016/SVG/main" r:embed="rId35"/>
+              </a:ext>
+            </a:extLst>
+          </a:blip>
+          <a:stretch>
+            <a:fillRect/>
+          </a:stretch>
+        </p:blipFill>
+        <p:spPr>
+          <a:xfrm>
+            <a:off x="5907196" y="2911420"/>
+            <a:ext cx="914400" cy="914400"/>
           </a:xfrm>
           <a:prstGeom prst="rect">
             <a:avLst/>

</xml_diff>